<commit_message>
Push Sun March 15
This is going to be a bunch of re-organization
</commit_message>
<xml_diff>
--- a/ClassUpdates/DataUpdate.pptx
+++ b/ClassUpdates/DataUpdate.pptx
@@ -112,6 +112,11 @@
       </a:defRPr>
     </a:lvl9pPr>
   </p:defaultTextStyle>
+  <p:extLst>
+    <p:ext uri="{EFAFB233-063F-42B5-8137-9DF3F51BA10A}">
+      <p15:sldGuideLst xmlns:p15="http://schemas.microsoft.com/office/powerpoint/2012/main"/>
+    </p:ext>
+  </p:extLst>
 </p:presentation>
 </file>
 
@@ -197,7 +202,7 @@
           <a:p>
             <a:fld id="{1B26C9DB-3ACB-EF4C-B012-3E7BEDD2A0BD}" type="datetimeFigureOut">
               <a:rPr lang="en-US" smtClean="0"/>
-              <a:t>3/3/20</a:t>
+              <a:t>3/10/20</a:t>
             </a:fld>
             <a:endParaRPr lang="en-US"/>
           </a:p>
@@ -695,7 +700,7 @@
           <a:p>
             <a:fld id="{4EB2C14B-6B20-8B45-858B-DBD3A4ACC799}" type="datetimeFigureOut">
               <a:rPr lang="en-US" smtClean="0"/>
-              <a:t>3/3/20</a:t>
+              <a:t>3/10/20</a:t>
             </a:fld>
             <a:endParaRPr lang="en-US"/>
           </a:p>
@@ -893,7 +898,7 @@
           <a:p>
             <a:fld id="{4EB2C14B-6B20-8B45-858B-DBD3A4ACC799}" type="datetimeFigureOut">
               <a:rPr lang="en-US" smtClean="0"/>
-              <a:t>3/3/20</a:t>
+              <a:t>3/10/20</a:t>
             </a:fld>
             <a:endParaRPr lang="en-US"/>
           </a:p>
@@ -1101,7 +1106,7 @@
           <a:p>
             <a:fld id="{4EB2C14B-6B20-8B45-858B-DBD3A4ACC799}" type="datetimeFigureOut">
               <a:rPr lang="en-US" smtClean="0"/>
-              <a:t>3/3/20</a:t>
+              <a:t>3/10/20</a:t>
             </a:fld>
             <a:endParaRPr lang="en-US"/>
           </a:p>
@@ -1299,7 +1304,7 @@
           <a:p>
             <a:fld id="{4EB2C14B-6B20-8B45-858B-DBD3A4ACC799}" type="datetimeFigureOut">
               <a:rPr lang="en-US" smtClean="0"/>
-              <a:t>3/3/20</a:t>
+              <a:t>3/10/20</a:t>
             </a:fld>
             <a:endParaRPr lang="en-US"/>
           </a:p>
@@ -1574,7 +1579,7 @@
           <a:p>
             <a:fld id="{4EB2C14B-6B20-8B45-858B-DBD3A4ACC799}" type="datetimeFigureOut">
               <a:rPr lang="en-US" smtClean="0"/>
-              <a:t>3/3/20</a:t>
+              <a:t>3/10/20</a:t>
             </a:fld>
             <a:endParaRPr lang="en-US"/>
           </a:p>
@@ -1839,7 +1844,7 @@
           <a:p>
             <a:fld id="{4EB2C14B-6B20-8B45-858B-DBD3A4ACC799}" type="datetimeFigureOut">
               <a:rPr lang="en-US" smtClean="0"/>
-              <a:t>3/3/20</a:t>
+              <a:t>3/10/20</a:t>
             </a:fld>
             <a:endParaRPr lang="en-US"/>
           </a:p>
@@ -2251,7 +2256,7 @@
           <a:p>
             <a:fld id="{4EB2C14B-6B20-8B45-858B-DBD3A4ACC799}" type="datetimeFigureOut">
               <a:rPr lang="en-US" smtClean="0"/>
-              <a:t>3/3/20</a:t>
+              <a:t>3/10/20</a:t>
             </a:fld>
             <a:endParaRPr lang="en-US"/>
           </a:p>
@@ -2392,7 +2397,7 @@
           <a:p>
             <a:fld id="{4EB2C14B-6B20-8B45-858B-DBD3A4ACC799}" type="datetimeFigureOut">
               <a:rPr lang="en-US" smtClean="0"/>
-              <a:t>3/3/20</a:t>
+              <a:t>3/10/20</a:t>
             </a:fld>
             <a:endParaRPr lang="en-US"/>
           </a:p>
@@ -2505,7 +2510,7 @@
           <a:p>
             <a:fld id="{4EB2C14B-6B20-8B45-858B-DBD3A4ACC799}" type="datetimeFigureOut">
               <a:rPr lang="en-US" smtClean="0"/>
-              <a:t>3/3/20</a:t>
+              <a:t>3/10/20</a:t>
             </a:fld>
             <a:endParaRPr lang="en-US"/>
           </a:p>
@@ -2816,7 +2821,7 @@
           <a:p>
             <a:fld id="{4EB2C14B-6B20-8B45-858B-DBD3A4ACC799}" type="datetimeFigureOut">
               <a:rPr lang="en-US" smtClean="0"/>
-              <a:t>3/3/20</a:t>
+              <a:t>3/10/20</a:t>
             </a:fld>
             <a:endParaRPr lang="en-US"/>
           </a:p>
@@ -3104,7 +3109,7 @@
           <a:p>
             <a:fld id="{4EB2C14B-6B20-8B45-858B-DBD3A4ACC799}" type="datetimeFigureOut">
               <a:rPr lang="en-US" smtClean="0"/>
-              <a:t>3/3/20</a:t>
+              <a:t>3/10/20</a:t>
             </a:fld>
             <a:endParaRPr lang="en-US"/>
           </a:p>
@@ -3345,7 +3350,7 @@
           <a:p>
             <a:fld id="{4EB2C14B-6B20-8B45-858B-DBD3A4ACC799}" type="datetimeFigureOut">
               <a:rPr lang="en-US" smtClean="0"/>
-              <a:t>3/3/20</a:t>
+              <a:t>3/10/20</a:t>
             </a:fld>
             <a:endParaRPr lang="en-US"/>
           </a:p>
@@ -4009,7 +4014,7 @@
         </p:nvSpPr>
         <p:spPr>
           <a:xfrm>
-            <a:off x="838200" y="365126"/>
+            <a:off x="838200" y="13776"/>
             <a:ext cx="10515600" cy="771466"/>
           </a:xfrm>
         </p:spPr>
@@ -4043,7 +4048,7 @@
         </p:nvSpPr>
         <p:spPr>
           <a:xfrm>
-            <a:off x="214357" y="1136593"/>
+            <a:off x="137401" y="521296"/>
             <a:ext cx="7058891" cy="1754390"/>
           </a:xfrm>
         </p:spPr>
@@ -4054,7 +4059,7 @@
           <a:lstStyle/>
           <a:p>
             <a:r>
-              <a:rPr lang="en-US" sz="2400" dirty="0">
+              <a:rPr lang="en-US" sz="2000" dirty="0">
                 <a:sym typeface="Wingdings" pitchFamily="2" charset="2"/>
               </a:rPr>
               <a:t>Full data is 286 variables, 2495 observations</a:t>
@@ -4063,16 +4068,16 @@
           <a:p>
             <a:pPr lvl="1"/>
             <a:r>
-              <a:rPr lang="en-US" dirty="0">
+              <a:rPr lang="en-US" sz="2000" dirty="0">
                 <a:sym typeface="Wingdings" pitchFamily="2" charset="2"/>
               </a:rPr>
-              <a:t>PHQ2, PHQ9, QDP, “stuff”</a:t>
+              <a:t>PHQ2, PHQ9, QDP</a:t>
             </a:r>
           </a:p>
           <a:p>
             <a:pPr lvl="1"/>
             <a:r>
-              <a:rPr lang="en-US" dirty="0">
+              <a:rPr lang="en-US" sz="2000" dirty="0">
                 <a:sym typeface="Wingdings" pitchFamily="2" charset="2"/>
               </a:rPr>
               <a:t>Data dictionary needed if further analyses will be expected</a:t>
@@ -4092,12 +4097,80 @@
           </a:p>
         </p:txBody>
       </p:sp>
+      <p:sp>
+        <p:nvSpPr>
+          <p:cNvPr id="11" name="TextBox 10">
+            <a:extLst>
+              <a:ext uri="{FF2B5EF4-FFF2-40B4-BE49-F238E27FC236}">
+                <a16:creationId xmlns:a16="http://schemas.microsoft.com/office/drawing/2014/main" id="{0D2C8389-01F5-4C48-A9E9-FCC229E3FDAB}"/>
+              </a:ext>
+            </a:extLst>
+          </p:cNvPr>
+          <p:cNvSpPr txBox="1"/>
+          <p:nvPr/>
+        </p:nvSpPr>
+        <p:spPr>
+          <a:xfrm>
+            <a:off x="7196292" y="399509"/>
+            <a:ext cx="5221480" cy="1354217"/>
+          </a:xfrm>
+          <a:prstGeom prst="rect">
+            <a:avLst/>
+          </a:prstGeom>
+          <a:noFill/>
+        </p:spPr>
+        <p:txBody>
+          <a:bodyPr wrap="square" rtlCol="0">
+            <a:spAutoFit/>
+          </a:bodyPr>
+          <a:lstStyle/>
+          <a:p>
+            <a:pPr marL="742950" lvl="1" indent="-285750">
+              <a:buFont typeface="Arial" panose="020B0604020202020204" pitchFamily="34" charset="0"/>
+              <a:buChar char="•"/>
+            </a:pPr>
+            <a:r>
+              <a:rPr lang="en-US" sz="2000" dirty="0">
+                <a:sym typeface="Wingdings" pitchFamily="2" charset="2"/>
+              </a:rPr>
+              <a:t>Lots of </a:t>
+            </a:r>
+            <a:r>
+              <a:rPr lang="en-US" sz="2400" dirty="0">
+                <a:sym typeface="Wingdings" pitchFamily="2" charset="2"/>
+              </a:rPr>
+              <a:t>calculated</a:t>
+            </a:r>
+            <a:r>
+              <a:rPr lang="en-US" sz="2000" dirty="0">
+                <a:sym typeface="Wingdings" pitchFamily="2" charset="2"/>
+              </a:rPr>
+              <a:t> and ”nested” variables</a:t>
+            </a:r>
+          </a:p>
+          <a:p>
+            <a:pPr marL="742950" lvl="1" indent="-285750">
+              <a:buFont typeface="Arial" panose="020B0604020202020204" pitchFamily="34" charset="0"/>
+              <a:buChar char="•"/>
+            </a:pPr>
+            <a:r>
+              <a:rPr lang="en-US" sz="2000" dirty="0">
+                <a:sym typeface="Wingdings" pitchFamily="2" charset="2"/>
+              </a:rPr>
+              <a:t>Demographic data: Age &amp; Gender</a:t>
+            </a:r>
+          </a:p>
+          <a:p>
+            <a:endParaRPr lang="en-US" dirty="0"/>
+          </a:p>
+        </p:txBody>
+      </p:sp>
       <p:pic>
         <p:nvPicPr>
-          <p:cNvPr id="6" name="Picture 5" descr="A picture containing drawing&#10;&#10;Description automatically generated">
-            <a:extLst>
-              <a:ext uri="{FF2B5EF4-FFF2-40B4-BE49-F238E27FC236}">
-                <a16:creationId xmlns:a16="http://schemas.microsoft.com/office/drawing/2014/main" id="{147017DB-A7A9-FC4B-8BCB-366BC6749744}"/>
+          <p:cNvPr id="5" name="Picture 4" descr="A close up of a flag&#10;&#10;Description automatically generated">
+            <a:extLst>
+              <a:ext uri="{FF2B5EF4-FFF2-40B4-BE49-F238E27FC236}">
+                <a16:creationId xmlns:a16="http://schemas.microsoft.com/office/drawing/2014/main" id="{C1746E49-AEE5-A64F-8E7A-1ED4A5C78576}"/>
               </a:ext>
             </a:extLst>
           </p:cNvPr>
@@ -4114,8 +4187,8 @@
         </p:blipFill>
         <p:spPr>
           <a:xfrm>
-            <a:off x="4978398" y="2869290"/>
-            <a:ext cx="6854215" cy="3688527"/>
+            <a:off x="137401" y="1550435"/>
+            <a:ext cx="4647942" cy="4589107"/>
           </a:xfrm>
           <a:prstGeom prst="rect">
             <a:avLst/>
@@ -4124,10 +4197,10 @@
       </p:pic>
       <p:pic>
         <p:nvPicPr>
-          <p:cNvPr id="10" name="Picture 9" descr="A picture containing watercraft, transport&#10;&#10;Description automatically generated">
-            <a:extLst>
-              <a:ext uri="{FF2B5EF4-FFF2-40B4-BE49-F238E27FC236}">
-                <a16:creationId xmlns:a16="http://schemas.microsoft.com/office/drawing/2014/main" id="{C0A6C945-93D0-0E45-9000-A6132EE84AA4}"/>
+          <p:cNvPr id="8" name="Picture 7" descr="A picture containing drawing&#10;&#10;Description automatically generated">
+            <a:extLst>
+              <a:ext uri="{FF2B5EF4-FFF2-40B4-BE49-F238E27FC236}">
+                <a16:creationId xmlns:a16="http://schemas.microsoft.com/office/drawing/2014/main" id="{09947EC8-AC23-064C-8E07-6BFD3AD99D92}"/>
               </a:ext>
             </a:extLst>
           </p:cNvPr>
@@ -4144,79 +4217,225 @@
         </p:blipFill>
         <p:spPr>
           <a:xfrm>
-            <a:off x="137401" y="2787396"/>
-            <a:ext cx="4924126" cy="3990366"/>
+            <a:off x="3557685" y="1808213"/>
+            <a:ext cx="787221" cy="605971"/>
           </a:xfrm>
           <a:prstGeom prst="rect">
             <a:avLst/>
           </a:prstGeom>
         </p:spPr>
       </p:pic>
-      <p:sp>
-        <p:nvSpPr>
-          <p:cNvPr id="11" name="TextBox 10">
-            <a:extLst>
-              <a:ext uri="{FF2B5EF4-FFF2-40B4-BE49-F238E27FC236}">
-                <a16:creationId xmlns:a16="http://schemas.microsoft.com/office/drawing/2014/main" id="{0D2C8389-01F5-4C48-A9E9-FCC229E3FDAB}"/>
-              </a:ext>
-            </a:extLst>
-          </p:cNvPr>
-          <p:cNvSpPr txBox="1"/>
+      <p:pic>
+        <p:nvPicPr>
+          <p:cNvPr id="6" name="Picture 5" descr="A picture containing drawing&#10;&#10;Description automatically generated">
+            <a:extLst>
+              <a:ext uri="{FF2B5EF4-FFF2-40B4-BE49-F238E27FC236}">
+                <a16:creationId xmlns:a16="http://schemas.microsoft.com/office/drawing/2014/main" id="{147017DB-A7A9-FC4B-8BCB-366BC6749744}"/>
+              </a:ext>
+            </a:extLst>
+          </p:cNvPr>
+          <p:cNvPicPr>
+            <a:picLocks noChangeAspect="1"/>
+          </p:cNvPicPr>
           <p:nvPr/>
-        </p:nvSpPr>
+        </p:nvPicPr>
+        <p:blipFill rotWithShape="1">
+          <a:blip r:embed="rId4"/>
+          <a:srcRect t="2319"/>
+          <a:stretch/>
+        </p:blipFill>
         <p:spPr>
           <a:xfrm>
-            <a:off x="7127192" y="1290414"/>
-            <a:ext cx="5221480" cy="1354217"/>
+            <a:off x="4785343" y="1808213"/>
+            <a:ext cx="7316902" cy="3846200"/>
           </a:xfrm>
           <a:prstGeom prst="rect">
             <a:avLst/>
           </a:prstGeom>
-          <a:noFill/>
         </p:spPr>
-        <p:txBody>
-          <a:bodyPr wrap="square" rtlCol="0">
+      </p:pic>
+      <p:sp>
+        <p:nvSpPr>
+          <p:cNvPr id="13" name="TextBox 12">
+            <a:extLst>
+              <a:ext uri="{FF2B5EF4-FFF2-40B4-BE49-F238E27FC236}">
+                <a16:creationId xmlns:a16="http://schemas.microsoft.com/office/drawing/2014/main" id="{147DBDAC-E110-9A4B-B22F-AE289EB8B434}"/>
+              </a:ext>
+            </a:extLst>
+          </p:cNvPr>
+          <p:cNvSpPr txBox="1"/>
+          <p:nvPr/>
+        </p:nvSpPr>
+        <p:spPr>
+          <a:xfrm>
+            <a:off x="8156728" y="5469747"/>
+            <a:ext cx="574132" cy="369332"/>
+          </a:xfrm>
+          <a:prstGeom prst="rect">
+            <a:avLst/>
+          </a:prstGeom>
+          <a:solidFill>
+            <a:schemeClr val="bg1"/>
+          </a:solidFill>
+        </p:spPr>
+        <p:txBody>
+          <a:bodyPr wrap="none" rtlCol="0">
             <a:spAutoFit/>
           </a:bodyPr>
           <a:lstStyle/>
           <a:p>
-            <a:pPr marL="742950" lvl="1" indent="-285750">
-              <a:buFont typeface="Arial" panose="020B0604020202020204" pitchFamily="34" charset="0"/>
-              <a:buChar char="•"/>
-            </a:pPr>
-            <a:r>
-              <a:rPr lang="en-US" sz="2000" dirty="0">
-                <a:sym typeface="Wingdings" pitchFamily="2" charset="2"/>
-              </a:rPr>
-              <a:t>Lots of </a:t>
-            </a:r>
-            <a:r>
-              <a:rPr lang="en-US" sz="2400" dirty="0">
-                <a:sym typeface="Wingdings" pitchFamily="2" charset="2"/>
-              </a:rPr>
-              <a:t>calculated</a:t>
-            </a:r>
-            <a:r>
-              <a:rPr lang="en-US" sz="2000" dirty="0">
-                <a:sym typeface="Wingdings" pitchFamily="2" charset="2"/>
-              </a:rPr>
-              <a:t> and ”nested” variables</a:t>
-            </a:r>
-          </a:p>
-          <a:p>
-            <a:pPr marL="742950" lvl="1" indent="-285750">
-              <a:buFont typeface="Arial" panose="020B0604020202020204" pitchFamily="34" charset="0"/>
-              <a:buChar char="•"/>
-            </a:pPr>
-            <a:r>
-              <a:rPr lang="en-US" sz="2000" dirty="0">
-                <a:sym typeface="Wingdings" pitchFamily="2" charset="2"/>
-              </a:rPr>
-              <a:t>Demographic data: Age &amp; Gender</a:t>
-            </a:r>
-          </a:p>
-          <a:p>
-            <a:endParaRPr lang="en-US" dirty="0"/>
+            <a:r>
+              <a:rPr lang="en-US" dirty="0"/>
+              <a:t>AGE</a:t>
+            </a:r>
+          </a:p>
+        </p:txBody>
+      </p:sp>
+      <p:sp>
+        <p:nvSpPr>
+          <p:cNvPr id="14" name="TextBox 13">
+            <a:extLst>
+              <a:ext uri="{FF2B5EF4-FFF2-40B4-BE49-F238E27FC236}">
+                <a16:creationId xmlns:a16="http://schemas.microsoft.com/office/drawing/2014/main" id="{6CDD8171-1DEB-D044-BE0F-5A07FB5FE770}"/>
+              </a:ext>
+            </a:extLst>
+          </p:cNvPr>
+          <p:cNvSpPr txBox="1"/>
+          <p:nvPr/>
+        </p:nvSpPr>
+        <p:spPr>
+          <a:xfrm>
+            <a:off x="6378670" y="5451541"/>
+            <a:ext cx="418704" cy="369332"/>
+          </a:xfrm>
+          <a:prstGeom prst="rect">
+            <a:avLst/>
+          </a:prstGeom>
+          <a:solidFill>
+            <a:schemeClr val="bg1"/>
+          </a:solidFill>
+        </p:spPr>
+        <p:txBody>
+          <a:bodyPr wrap="none" rtlCol="0">
+            <a:spAutoFit/>
+          </a:bodyPr>
+          <a:lstStyle/>
+          <a:p>
+            <a:r>
+              <a:rPr lang="en-US" dirty="0"/>
+              <a:t>25</a:t>
+            </a:r>
+          </a:p>
+        </p:txBody>
+      </p:sp>
+      <p:sp>
+        <p:nvSpPr>
+          <p:cNvPr id="16" name="TextBox 15">
+            <a:extLst>
+              <a:ext uri="{FF2B5EF4-FFF2-40B4-BE49-F238E27FC236}">
+                <a16:creationId xmlns:a16="http://schemas.microsoft.com/office/drawing/2014/main" id="{B8EB606A-A0EC-B645-8F36-8A3CDB786D7E}"/>
+              </a:ext>
+            </a:extLst>
+          </p:cNvPr>
+          <p:cNvSpPr txBox="1"/>
+          <p:nvPr/>
+        </p:nvSpPr>
+        <p:spPr>
+          <a:xfrm>
+            <a:off x="10207200" y="5461393"/>
+            <a:ext cx="418704" cy="369332"/>
+          </a:xfrm>
+          <a:prstGeom prst="rect">
+            <a:avLst/>
+          </a:prstGeom>
+          <a:solidFill>
+            <a:schemeClr val="bg1"/>
+          </a:solidFill>
+        </p:spPr>
+        <p:txBody>
+          <a:bodyPr wrap="none" rtlCol="0">
+            <a:spAutoFit/>
+          </a:bodyPr>
+          <a:lstStyle/>
+          <a:p>
+            <a:r>
+              <a:rPr lang="en-US" dirty="0"/>
+              <a:t>75</a:t>
+            </a:r>
+          </a:p>
+        </p:txBody>
+      </p:sp>
+      <p:sp>
+        <p:nvSpPr>
+          <p:cNvPr id="17" name="TextBox 16">
+            <a:extLst>
+              <a:ext uri="{FF2B5EF4-FFF2-40B4-BE49-F238E27FC236}">
+                <a16:creationId xmlns:a16="http://schemas.microsoft.com/office/drawing/2014/main" id="{BBEB896C-513A-EB45-917C-A8CF4DE7CEBA}"/>
+              </a:ext>
+            </a:extLst>
+          </p:cNvPr>
+          <p:cNvSpPr txBox="1"/>
+          <p:nvPr/>
+        </p:nvSpPr>
+        <p:spPr>
+          <a:xfrm>
+            <a:off x="4847218" y="2532504"/>
+            <a:ext cx="535724" cy="369332"/>
+          </a:xfrm>
+          <a:prstGeom prst="rect">
+            <a:avLst/>
+          </a:prstGeom>
+          <a:solidFill>
+            <a:schemeClr val="bg1"/>
+          </a:solidFill>
+        </p:spPr>
+        <p:txBody>
+          <a:bodyPr wrap="none" rtlCol="0">
+            <a:spAutoFit/>
+          </a:bodyPr>
+          <a:lstStyle/>
+          <a:p>
+            <a:r>
+              <a:rPr lang="en-US" dirty="0"/>
+              <a:t>150</a:t>
+            </a:r>
+          </a:p>
+        </p:txBody>
+      </p:sp>
+      <p:sp>
+        <p:nvSpPr>
+          <p:cNvPr id="18" name="TextBox 17">
+            <a:extLst>
+              <a:ext uri="{FF2B5EF4-FFF2-40B4-BE49-F238E27FC236}">
+                <a16:creationId xmlns:a16="http://schemas.microsoft.com/office/drawing/2014/main" id="{21D78B7E-BE71-F340-BC7F-7B485598D949}"/>
+              </a:ext>
+            </a:extLst>
+          </p:cNvPr>
+          <p:cNvSpPr txBox="1"/>
+          <p:nvPr/>
+        </p:nvSpPr>
+        <p:spPr>
+          <a:xfrm>
+            <a:off x="4847218" y="4257486"/>
+            <a:ext cx="418704" cy="369332"/>
+          </a:xfrm>
+          <a:prstGeom prst="rect">
+            <a:avLst/>
+          </a:prstGeom>
+          <a:solidFill>
+            <a:schemeClr val="bg1"/>
+          </a:solidFill>
+        </p:spPr>
+        <p:txBody>
+          <a:bodyPr wrap="none" rtlCol="0">
+            <a:spAutoFit/>
+          </a:bodyPr>
+          <a:lstStyle/>
+          <a:p>
+            <a:r>
+              <a:rPr lang="en-US" dirty="0"/>
+              <a:t>50</a:t>
+            </a:r>
           </a:p>
         </p:txBody>
       </p:sp>
@@ -4300,19 +4519,314 @@
             <p:ph idx="1"/>
           </p:nvPr>
         </p:nvPicPr>
-        <p:blipFill>
+        <p:blipFill rotWithShape="1">
           <a:blip r:embed="rId2"/>
-          <a:stretch>
-            <a:fillRect/>
-          </a:stretch>
+          <a:srcRect t="1472"/>
+          <a:stretch/>
         </p:blipFill>
         <p:spPr>
           <a:xfrm>
-            <a:off x="798043" y="932874"/>
-            <a:ext cx="10595913" cy="5717020"/>
+            <a:off x="798043" y="1017036"/>
+            <a:ext cx="10595913" cy="5632857"/>
           </a:xfrm>
         </p:spPr>
       </p:pic>
+      <p:sp>
+        <p:nvSpPr>
+          <p:cNvPr id="3" name="TextBox 2">
+            <a:extLst>
+              <a:ext uri="{FF2B5EF4-FFF2-40B4-BE49-F238E27FC236}">
+                <a16:creationId xmlns:a16="http://schemas.microsoft.com/office/drawing/2014/main" id="{C9ACFC22-F0C3-0F4B-9DAA-5F4D23F3E9E8}"/>
+              </a:ext>
+            </a:extLst>
+          </p:cNvPr>
+          <p:cNvSpPr txBox="1"/>
+          <p:nvPr/>
+        </p:nvSpPr>
+        <p:spPr>
+          <a:xfrm>
+            <a:off x="5646299" y="6364722"/>
+            <a:ext cx="1585562" cy="369332"/>
+          </a:xfrm>
+          <a:prstGeom prst="rect">
+            <a:avLst/>
+          </a:prstGeom>
+          <a:solidFill>
+            <a:schemeClr val="bg1"/>
+          </a:solidFill>
+        </p:spPr>
+        <p:txBody>
+          <a:bodyPr wrap="none" rtlCol="0">
+            <a:spAutoFit/>
+          </a:bodyPr>
+          <a:lstStyle/>
+          <a:p>
+            <a:r>
+              <a:rPr lang="en-US" dirty="0"/>
+              <a:t>Response Total</a:t>
+            </a:r>
+          </a:p>
+        </p:txBody>
+      </p:sp>
+      <p:sp>
+        <p:nvSpPr>
+          <p:cNvPr id="4" name="TextBox 3">
+            <a:extLst>
+              <a:ext uri="{FF2B5EF4-FFF2-40B4-BE49-F238E27FC236}">
+                <a16:creationId xmlns:a16="http://schemas.microsoft.com/office/drawing/2014/main" id="{96CEE5C3-04BD-2348-B9C1-D80FE0F59171}"/>
+              </a:ext>
+            </a:extLst>
+          </p:cNvPr>
+          <p:cNvSpPr txBox="1"/>
+          <p:nvPr/>
+        </p:nvSpPr>
+        <p:spPr>
+          <a:xfrm>
+            <a:off x="8240486" y="6377072"/>
+            <a:ext cx="418704" cy="369332"/>
+          </a:xfrm>
+          <a:prstGeom prst="rect">
+            <a:avLst/>
+          </a:prstGeom>
+          <a:solidFill>
+            <a:schemeClr val="bg1"/>
+          </a:solidFill>
+        </p:spPr>
+        <p:txBody>
+          <a:bodyPr wrap="none" rtlCol="0">
+            <a:spAutoFit/>
+          </a:bodyPr>
+          <a:lstStyle/>
+          <a:p>
+            <a:r>
+              <a:rPr lang="en-US" dirty="0"/>
+              <a:t>20</a:t>
+            </a:r>
+          </a:p>
+        </p:txBody>
+      </p:sp>
+      <p:sp>
+        <p:nvSpPr>
+          <p:cNvPr id="6" name="TextBox 5">
+            <a:extLst>
+              <a:ext uri="{FF2B5EF4-FFF2-40B4-BE49-F238E27FC236}">
+                <a16:creationId xmlns:a16="http://schemas.microsoft.com/office/drawing/2014/main" id="{DD2CCC83-0DEB-DD45-A713-8E2C7F2A4B27}"/>
+              </a:ext>
+            </a:extLst>
+          </p:cNvPr>
+          <p:cNvSpPr txBox="1"/>
+          <p:nvPr/>
+        </p:nvSpPr>
+        <p:spPr>
+          <a:xfrm>
+            <a:off x="4811486" y="6364722"/>
+            <a:ext cx="418704" cy="369332"/>
+          </a:xfrm>
+          <a:prstGeom prst="rect">
+            <a:avLst/>
+          </a:prstGeom>
+          <a:solidFill>
+            <a:schemeClr val="bg1"/>
+          </a:solidFill>
+        </p:spPr>
+        <p:txBody>
+          <a:bodyPr wrap="none" rtlCol="0">
+            <a:spAutoFit/>
+          </a:bodyPr>
+          <a:lstStyle/>
+          <a:p>
+            <a:r>
+              <a:rPr lang="en-US" dirty="0"/>
+              <a:t>10</a:t>
+            </a:r>
+          </a:p>
+        </p:txBody>
+      </p:sp>
+      <p:sp>
+        <p:nvSpPr>
+          <p:cNvPr id="7" name="TextBox 6">
+            <a:extLst>
+              <a:ext uri="{FF2B5EF4-FFF2-40B4-BE49-F238E27FC236}">
+                <a16:creationId xmlns:a16="http://schemas.microsoft.com/office/drawing/2014/main" id="{BF1C8CCC-A1AE-7B41-8D56-B4F2A9D80DC1}"/>
+              </a:ext>
+            </a:extLst>
+          </p:cNvPr>
+          <p:cNvSpPr txBox="1"/>
+          <p:nvPr/>
+        </p:nvSpPr>
+        <p:spPr>
+          <a:xfrm>
+            <a:off x="10624458" y="6377072"/>
+            <a:ext cx="418704" cy="369332"/>
+          </a:xfrm>
+          <a:prstGeom prst="rect">
+            <a:avLst/>
+          </a:prstGeom>
+          <a:solidFill>
+            <a:schemeClr val="bg1"/>
+          </a:solidFill>
+        </p:spPr>
+        <p:txBody>
+          <a:bodyPr wrap="none" rtlCol="0">
+            <a:spAutoFit/>
+          </a:bodyPr>
+          <a:lstStyle/>
+          <a:p>
+            <a:r>
+              <a:rPr lang="en-US" dirty="0"/>
+              <a:t>27</a:t>
+            </a:r>
+          </a:p>
+        </p:txBody>
+      </p:sp>
+      <p:sp>
+        <p:nvSpPr>
+          <p:cNvPr id="8" name="TextBox 7">
+            <a:extLst>
+              <a:ext uri="{FF2B5EF4-FFF2-40B4-BE49-F238E27FC236}">
+                <a16:creationId xmlns:a16="http://schemas.microsoft.com/office/drawing/2014/main" id="{1C0E9C33-9652-824E-9D7D-015B0D1DABC5}"/>
+              </a:ext>
+            </a:extLst>
+          </p:cNvPr>
+          <p:cNvSpPr txBox="1"/>
+          <p:nvPr/>
+        </p:nvSpPr>
+        <p:spPr>
+          <a:xfrm>
+            <a:off x="1423937" y="6377072"/>
+            <a:ext cx="301686" cy="369332"/>
+          </a:xfrm>
+          <a:prstGeom prst="rect">
+            <a:avLst/>
+          </a:prstGeom>
+          <a:solidFill>
+            <a:schemeClr val="bg1"/>
+          </a:solidFill>
+        </p:spPr>
+        <p:txBody>
+          <a:bodyPr wrap="none" rtlCol="0">
+            <a:spAutoFit/>
+          </a:bodyPr>
+          <a:lstStyle/>
+          <a:p>
+            <a:r>
+              <a:rPr lang="en-US" dirty="0"/>
+              <a:t>0</a:t>
+            </a:r>
+          </a:p>
+        </p:txBody>
+      </p:sp>
+      <p:sp>
+        <p:nvSpPr>
+          <p:cNvPr id="9" name="TextBox 8">
+            <a:extLst>
+              <a:ext uri="{FF2B5EF4-FFF2-40B4-BE49-F238E27FC236}">
+                <a16:creationId xmlns:a16="http://schemas.microsoft.com/office/drawing/2014/main" id="{C5EF3DEC-0BFB-CD4F-BFCF-D4F6072D3EC2}"/>
+              </a:ext>
+            </a:extLst>
+          </p:cNvPr>
+          <p:cNvSpPr txBox="1"/>
+          <p:nvPr/>
+        </p:nvSpPr>
+        <p:spPr>
+          <a:xfrm>
+            <a:off x="610104" y="1601903"/>
+            <a:ext cx="535724" cy="369332"/>
+          </a:xfrm>
+          <a:prstGeom prst="rect">
+            <a:avLst/>
+          </a:prstGeom>
+          <a:solidFill>
+            <a:schemeClr val="bg1"/>
+          </a:solidFill>
+        </p:spPr>
+        <p:txBody>
+          <a:bodyPr wrap="none" rtlCol="0">
+            <a:spAutoFit/>
+          </a:bodyPr>
+          <a:lstStyle/>
+          <a:p>
+            <a:r>
+              <a:rPr lang="en-US" dirty="0"/>
+              <a:t>300</a:t>
+            </a:r>
+          </a:p>
+        </p:txBody>
+      </p:sp>
+      <p:sp>
+        <p:nvSpPr>
+          <p:cNvPr id="10" name="TextBox 9">
+            <a:extLst>
+              <a:ext uri="{FF2B5EF4-FFF2-40B4-BE49-F238E27FC236}">
+                <a16:creationId xmlns:a16="http://schemas.microsoft.com/office/drawing/2014/main" id="{CCE0BE00-84AB-D142-8800-678E71275E48}"/>
+              </a:ext>
+            </a:extLst>
+          </p:cNvPr>
+          <p:cNvSpPr txBox="1"/>
+          <p:nvPr/>
+        </p:nvSpPr>
+        <p:spPr>
+          <a:xfrm rot="16200000">
+            <a:off x="295018" y="3441968"/>
+            <a:ext cx="1165897" cy="369332"/>
+          </a:xfrm>
+          <a:prstGeom prst="rect">
+            <a:avLst/>
+          </a:prstGeom>
+          <a:solidFill>
+            <a:schemeClr val="bg1"/>
+          </a:solidFill>
+        </p:spPr>
+        <p:txBody>
+          <a:bodyPr wrap="none" rtlCol="0">
+            <a:spAutoFit/>
+          </a:bodyPr>
+          <a:lstStyle/>
+          <a:p>
+            <a:r>
+              <a:rPr lang="en-US" dirty="0"/>
+              <a:t>Frequency</a:t>
+            </a:r>
+          </a:p>
+        </p:txBody>
+      </p:sp>
+      <p:sp>
+        <p:nvSpPr>
+          <p:cNvPr id="11" name="TextBox 10">
+            <a:extLst>
+              <a:ext uri="{FF2B5EF4-FFF2-40B4-BE49-F238E27FC236}">
+                <a16:creationId xmlns:a16="http://schemas.microsoft.com/office/drawing/2014/main" id="{BDD2266C-C213-BA4E-A33B-D287DC8A11EF}"/>
+              </a:ext>
+            </a:extLst>
+          </p:cNvPr>
+          <p:cNvSpPr txBox="1"/>
+          <p:nvPr/>
+        </p:nvSpPr>
+        <p:spPr>
+          <a:xfrm>
+            <a:off x="610104" y="4551403"/>
+            <a:ext cx="535724" cy="369332"/>
+          </a:xfrm>
+          <a:prstGeom prst="rect">
+            <a:avLst/>
+          </a:prstGeom>
+          <a:solidFill>
+            <a:schemeClr val="bg1"/>
+          </a:solidFill>
+        </p:spPr>
+        <p:txBody>
+          <a:bodyPr wrap="none" rtlCol="0">
+            <a:spAutoFit/>
+          </a:bodyPr>
+          <a:lstStyle/>
+          <a:p>
+            <a:r>
+              <a:rPr lang="en-US" dirty="0"/>
+              <a:t>100</a:t>
+            </a:r>
+          </a:p>
+        </p:txBody>
+      </p:sp>
     </p:spTree>
     <p:extLst>
       <p:ext uri="{BB962C8B-B14F-4D97-AF65-F5344CB8AC3E}">
@@ -4359,11 +4873,17 @@
             <p:ph type="title"/>
           </p:nvPr>
         </p:nvSpPr>
-        <p:spPr/>
+        <p:spPr>
+          <a:xfrm>
+            <a:off x="838200" y="18255"/>
+            <a:ext cx="10515600" cy="737525"/>
+          </a:xfrm>
+        </p:spPr>
         <p:txBody>
           <a:bodyPr/>
           <a:lstStyle/>
           <a:p>
+            <a:pPr algn="ctr"/>
             <a:r>
               <a:rPr lang="en-US" dirty="0"/>
               <a:t>Immediate Goals</a:t>
@@ -4387,10 +4907,15 @@
             <p:ph idx="1"/>
           </p:nvPr>
         </p:nvSpPr>
-        <p:spPr/>
+        <p:spPr>
+          <a:xfrm>
+            <a:off x="838200" y="1026368"/>
+            <a:ext cx="10515600" cy="5523722"/>
+          </a:xfrm>
+        </p:spPr>
         <p:txBody>
           <a:bodyPr>
-            <a:normAutofit lnSpcReduction="10000"/>
+            <a:normAutofit/>
           </a:bodyPr>
           <a:lstStyle/>
           <a:p>
@@ -4400,6 +4925,9 @@
             </a:r>
           </a:p>
           <a:p>
+            <a:endParaRPr lang="en-US" sz="1600" dirty="0"/>
+          </a:p>
+          <a:p>
             <a:r>
               <a:rPr lang="en-US" dirty="0"/>
               <a:t>Cross-validation sample-size convergence:</a:t>
@@ -4425,6 +4953,12 @@
               <a:rPr lang="en-US" dirty="0"/>
               <a:t>Compare average (minimum) accuracy across CV sets as sample size increases for Probabilistic Score and Conventional Score</a:t>
             </a:r>
+          </a:p>
+          <a:p>
+            <a:pPr marL="457200" lvl="1" indent="0">
+              <a:buNone/>
+            </a:pPr>
+            <a:endParaRPr lang="en-US" sz="1600" dirty="0"/>
           </a:p>
           <a:p>
             <a:r>

</xml_diff>